<commit_message>
added gateway architecture slide
</commit_message>
<xml_diff>
--- a/BLE-for-IoT-en.pptx
+++ b/BLE-for-IoT-en.pptx
@@ -13,6 +13,7 @@
     <p:sldId id="259" r:id="rId7"/>
     <p:sldId id="262" r:id="rId8"/>
     <p:sldId id="260" r:id="rId9"/>
+    <p:sldId id="267" r:id="rId10"/>
   </p:sldIdLst>
   <p:sldSz cx="9144000" cy="6858000" type="screen4x3"/>
   <p:notesSz cx="6858000" cy="9144000"/>
@@ -295,7 +296,7 @@
           <a:p>
             <a:fld id="{EEBDF196-FA60-4253-85AB-4CAF61A882F1}" type="datetimeFigureOut">
               <a:rPr kumimoji="1" lang="ja-JP" altLang="en-US" smtClean="0"/>
-              <a:t>2018/11/24</a:t>
+              <a:t>2019/1/2</a:t>
             </a:fld>
             <a:endParaRPr kumimoji="1" lang="ja-JP" altLang="en-US"/>
           </a:p>
@@ -497,7 +498,7 @@
           <a:p>
             <a:fld id="{EEBDF196-FA60-4253-85AB-4CAF61A882F1}" type="datetimeFigureOut">
               <a:rPr kumimoji="1" lang="ja-JP" altLang="en-US" smtClean="0"/>
-              <a:t>2018/11/24</a:t>
+              <a:t>2019/1/2</a:t>
             </a:fld>
             <a:endParaRPr kumimoji="1" lang="ja-JP" altLang="en-US"/>
           </a:p>
@@ -709,7 +710,7 @@
           <a:p>
             <a:fld id="{EEBDF196-FA60-4253-85AB-4CAF61A882F1}" type="datetimeFigureOut">
               <a:rPr kumimoji="1" lang="ja-JP" altLang="en-US" smtClean="0"/>
-              <a:t>2018/11/24</a:t>
+              <a:t>2019/1/2</a:t>
             </a:fld>
             <a:endParaRPr kumimoji="1" lang="ja-JP" altLang="en-US"/>
           </a:p>
@@ -911,7 +912,7 @@
           <a:p>
             <a:fld id="{EEBDF196-FA60-4253-85AB-4CAF61A882F1}" type="datetimeFigureOut">
               <a:rPr kumimoji="1" lang="ja-JP" altLang="en-US" smtClean="0"/>
-              <a:t>2018/11/24</a:t>
+              <a:t>2019/1/2</a:t>
             </a:fld>
             <a:endParaRPr kumimoji="1" lang="ja-JP" altLang="en-US"/>
           </a:p>
@@ -1157,7 +1158,7 @@
           <a:p>
             <a:fld id="{EEBDF196-FA60-4253-85AB-4CAF61A882F1}" type="datetimeFigureOut">
               <a:rPr kumimoji="1" lang="ja-JP" altLang="en-US" smtClean="0"/>
-              <a:t>2018/11/24</a:t>
+              <a:t>2019/1/2</a:t>
             </a:fld>
             <a:endParaRPr kumimoji="1" lang="ja-JP" altLang="en-US"/>
           </a:p>
@@ -1509,7 +1510,7 @@
           <a:p>
             <a:fld id="{EEBDF196-FA60-4253-85AB-4CAF61A882F1}" type="datetimeFigureOut">
               <a:rPr kumimoji="1" lang="ja-JP" altLang="en-US" smtClean="0"/>
-              <a:t>2018/11/24</a:t>
+              <a:t>2019/1/2</a:t>
             </a:fld>
             <a:endParaRPr kumimoji="1" lang="ja-JP" altLang="en-US"/>
           </a:p>
@@ -1995,7 +1996,7 @@
           <a:p>
             <a:fld id="{EEBDF196-FA60-4253-85AB-4CAF61A882F1}" type="datetimeFigureOut">
               <a:rPr kumimoji="1" lang="ja-JP" altLang="en-US" smtClean="0"/>
-              <a:t>2018/11/24</a:t>
+              <a:t>2019/1/2</a:t>
             </a:fld>
             <a:endParaRPr kumimoji="1" lang="ja-JP" altLang="en-US"/>
           </a:p>
@@ -2113,7 +2114,7 @@
           <a:p>
             <a:fld id="{EEBDF196-FA60-4253-85AB-4CAF61A882F1}" type="datetimeFigureOut">
               <a:rPr kumimoji="1" lang="ja-JP" altLang="en-US" smtClean="0"/>
-              <a:t>2018/11/24</a:t>
+              <a:t>2019/1/2</a:t>
             </a:fld>
             <a:endParaRPr kumimoji="1" lang="ja-JP" altLang="en-US"/>
           </a:p>
@@ -2208,7 +2209,7 @@
           <a:p>
             <a:fld id="{EEBDF196-FA60-4253-85AB-4CAF61A882F1}" type="datetimeFigureOut">
               <a:rPr kumimoji="1" lang="ja-JP" altLang="en-US" smtClean="0"/>
-              <a:t>2018/11/24</a:t>
+              <a:t>2019/1/2</a:t>
             </a:fld>
             <a:endParaRPr kumimoji="1" lang="ja-JP" altLang="en-US"/>
           </a:p>
@@ -2517,7 +2518,7 @@
           <a:p>
             <a:fld id="{EEBDF196-FA60-4253-85AB-4CAF61A882F1}" type="datetimeFigureOut">
               <a:rPr kumimoji="1" lang="ja-JP" altLang="en-US" smtClean="0"/>
-              <a:t>2018/11/24</a:t>
+              <a:t>2019/1/2</a:t>
             </a:fld>
             <a:endParaRPr kumimoji="1" lang="ja-JP" altLang="en-US"/>
           </a:p>
@@ -2770,7 +2771,7 @@
           <a:p>
             <a:fld id="{EEBDF196-FA60-4253-85AB-4CAF61A882F1}" type="datetimeFigureOut">
               <a:rPr kumimoji="1" lang="ja-JP" altLang="en-US" smtClean="0"/>
-              <a:t>2018/11/24</a:t>
+              <a:t>2019/1/2</a:t>
             </a:fld>
             <a:endParaRPr kumimoji="1" lang="ja-JP" altLang="en-US"/>
           </a:p>
@@ -3015,7 +3016,7 @@
           <a:p>
             <a:fld id="{EEBDF196-FA60-4253-85AB-4CAF61A882F1}" type="datetimeFigureOut">
               <a:rPr kumimoji="1" lang="ja-JP" altLang="en-US" smtClean="0"/>
-              <a:t>2018/11/24</a:t>
+              <a:t>2019/1/2</a:t>
             </a:fld>
             <a:endParaRPr kumimoji="1" lang="ja-JP" altLang="en-US"/>
           </a:p>
@@ -3407,7 +3408,7 @@
           <a:p>
             <a:r>
               <a:rPr kumimoji="1" lang="en-US" altLang="ja-JP" smtClean="0"/>
-              <a:t>BLE for IoT</a:t>
+              <a:t>BLE-IoT-Gwy</a:t>
             </a:r>
             <a:endParaRPr kumimoji="1" lang="ja-JP" altLang="en-US"/>
           </a:p>
@@ -3444,7 +3445,7 @@
           <a:p>
             <a:r>
               <a:rPr kumimoji="1" lang="en-US" altLang="ja-JP" smtClean="0"/>
-              <a:t>2018/11/25 </a:t>
+              <a:t>2019/01/02 </a:t>
             </a:r>
             <a:r>
               <a:rPr kumimoji="1" lang="en-US" altLang="ja-JP" smtClean="0"/>
@@ -5806,14 +5807,6 @@
               </a:rPr>
               <a:t>Gateway</a:t>
             </a:r>
-            <a:endParaRPr kumimoji="1" lang="en-US" altLang="ja-JP" smtClean="0">
-              <a:solidFill>
-                <a:schemeClr val="tx1">
-                  <a:lumMod val="50000"/>
-                  <a:lumOff val="50000"/>
-                </a:schemeClr>
-              </a:solidFill>
-            </a:endParaRPr>
           </a:p>
         </p:txBody>
       </p:sp>
@@ -7106,14 +7099,6 @@
               </a:rPr>
               <a:t>Gateway</a:t>
             </a:r>
-            <a:endParaRPr kumimoji="1" lang="en-US" altLang="ja-JP" smtClean="0">
-              <a:solidFill>
-                <a:schemeClr val="tx1">
-                  <a:lumMod val="50000"/>
-                  <a:lumOff val="50000"/>
-                </a:schemeClr>
-              </a:solidFill>
-            </a:endParaRPr>
           </a:p>
         </p:txBody>
       </p:sp>
@@ -7880,6 +7865,851 @@
     <p:extLst>
       <p:ext uri="{BB962C8B-B14F-4D97-AF65-F5344CB8AC3E}">
         <p14:creationId xmlns:p14="http://schemas.microsoft.com/office/powerpoint/2010/main" val="1867129352"/>
+      </p:ext>
+    </p:extLst>
+  </p:cSld>
+  <p:clrMapOvr>
+    <a:masterClrMapping/>
+  </p:clrMapOvr>
+  <p:timing>
+    <p:tnLst>
+      <p:par>
+        <p:cTn id="1" dur="indefinite" restart="never" nodeType="tmRoot"/>
+      </p:par>
+    </p:tnLst>
+  </p:timing>
+</p:sld>
+</file>
+
+<file path=ppt/slides/slide9.xml><?xml version="1.0" encoding="utf-8"?>
+<p:sld xmlns:a="http://schemas.openxmlformats.org/drawingml/2006/main" xmlns:r="http://schemas.openxmlformats.org/officeDocument/2006/relationships" xmlns:p="http://schemas.openxmlformats.org/presentationml/2006/main">
+  <p:cSld>
+    <p:spTree>
+      <p:nvGrpSpPr>
+        <p:cNvPr id="1" name=""/>
+        <p:cNvGrpSpPr/>
+        <p:nvPr/>
+      </p:nvGrpSpPr>
+      <p:grpSpPr>
+        <a:xfrm>
+          <a:off x="0" y="0"/>
+          <a:ext cx="0" cy="0"/>
+          <a:chOff x="0" y="0"/>
+          <a:chExt cx="0" cy="0"/>
+        </a:xfrm>
+      </p:grpSpPr>
+      <p:sp>
+        <p:nvSpPr>
+          <p:cNvPr id="2" name="タイトル 1"/>
+          <p:cNvSpPr>
+            <a:spLocks noGrp="1"/>
+          </p:cNvSpPr>
+          <p:nvPr>
+            <p:ph type="title"/>
+          </p:nvPr>
+        </p:nvSpPr>
+        <p:spPr>
+          <a:xfrm>
+            <a:off x="457200" y="282647"/>
+            <a:ext cx="8229600" cy="1143000"/>
+          </a:xfrm>
+        </p:spPr>
+        <p:txBody>
+          <a:bodyPr/>
+          <a:lstStyle/>
+          <a:p>
+            <a:r>
+              <a:rPr lang="en-US" altLang="ja-JP" smtClean="0"/>
+              <a:t>Gateway </a:t>
+            </a:r>
+            <a:r>
+              <a:rPr lang="en-US" altLang="ja-JP"/>
+              <a:t>Architecture</a:t>
+            </a:r>
+            <a:endParaRPr kumimoji="1" lang="ja-JP" altLang="en-US"/>
+          </a:p>
+        </p:txBody>
+      </p:sp>
+      <p:sp>
+        <p:nvSpPr>
+          <p:cNvPr id="3" name="正方形/長方形 2"/>
+          <p:cNvSpPr/>
+          <p:nvPr/>
+        </p:nvSpPr>
+        <p:spPr>
+          <a:xfrm>
+            <a:off x="2569536" y="2276872"/>
+            <a:ext cx="4004927" cy="2952328"/>
+          </a:xfrm>
+          <a:prstGeom prst="rect">
+            <a:avLst/>
+          </a:prstGeom>
+          <a:noFill/>
+          <a:ln w="3175">
+            <a:solidFill>
+              <a:schemeClr val="bg2">
+                <a:lumMod val="75000"/>
+              </a:schemeClr>
+            </a:solidFill>
+            <a:prstDash val="sysDot"/>
+          </a:ln>
+        </p:spPr>
+        <p:style>
+          <a:lnRef idx="2">
+            <a:schemeClr val="accent1">
+              <a:shade val="50000"/>
+            </a:schemeClr>
+          </a:lnRef>
+          <a:fillRef idx="1">
+            <a:schemeClr val="accent1"/>
+          </a:fillRef>
+          <a:effectRef idx="0">
+            <a:schemeClr val="accent1"/>
+          </a:effectRef>
+          <a:fontRef idx="minor">
+            <a:schemeClr val="lt1"/>
+          </a:fontRef>
+        </p:style>
+        <p:txBody>
+          <a:bodyPr rtlCol="0" anchor="ctr"/>
+          <a:lstStyle/>
+          <a:p>
+            <a:pPr algn="ctr"/>
+            <a:endParaRPr kumimoji="1" lang="en-US" altLang="ja-JP" smtClean="0">
+              <a:solidFill>
+                <a:schemeClr val="tx1">
+                  <a:lumMod val="50000"/>
+                  <a:lumOff val="50000"/>
+                </a:schemeClr>
+              </a:solidFill>
+            </a:endParaRPr>
+          </a:p>
+        </p:txBody>
+      </p:sp>
+      <p:sp>
+        <p:nvSpPr>
+          <p:cNvPr id="4" name="雲形吹き出し 3"/>
+          <p:cNvSpPr/>
+          <p:nvPr/>
+        </p:nvSpPr>
+        <p:spPr>
+          <a:xfrm>
+            <a:off x="1016274" y="3213828"/>
+            <a:ext cx="1008112" cy="740975"/>
+          </a:xfrm>
+          <a:prstGeom prst="cloudCallout">
+            <a:avLst/>
+          </a:prstGeom>
+          <a:solidFill>
+            <a:schemeClr val="accent1">
+              <a:lumMod val="20000"/>
+              <a:lumOff val="80000"/>
+            </a:schemeClr>
+          </a:solidFill>
+          <a:ln w="3175">
+            <a:prstDash val="sysDot"/>
+          </a:ln>
+        </p:spPr>
+        <p:style>
+          <a:lnRef idx="2">
+            <a:schemeClr val="accent1">
+              <a:shade val="50000"/>
+            </a:schemeClr>
+          </a:lnRef>
+          <a:fillRef idx="1">
+            <a:schemeClr val="accent1"/>
+          </a:fillRef>
+          <a:effectRef idx="0">
+            <a:schemeClr val="accent1"/>
+          </a:effectRef>
+          <a:fontRef idx="minor">
+            <a:schemeClr val="lt1"/>
+          </a:fontRef>
+        </p:style>
+        <p:txBody>
+          <a:bodyPr rot="0" spcFirstLastPara="0" vertOverflow="overflow" horzOverflow="overflow" vert="horz" wrap="square" lIns="91440" tIns="45720" rIns="91440" bIns="45720" numCol="1" spcCol="0" rtlCol="0" fromWordArt="0" anchor="ctr" anchorCtr="0" forceAA="0" compatLnSpc="1">
+            <a:prstTxWarp prst="textNoShape">
+              <a:avLst/>
+            </a:prstTxWarp>
+            <a:noAutofit/>
+          </a:bodyPr>
+          <a:lstStyle/>
+          <a:p>
+            <a:pPr algn="ctr"/>
+            <a:endParaRPr kumimoji="1" lang="ja-JP" altLang="en-US" smtClean="0">
+              <a:solidFill>
+                <a:schemeClr val="tx1">
+                  <a:lumMod val="50000"/>
+                  <a:lumOff val="50000"/>
+                </a:schemeClr>
+              </a:solidFill>
+            </a:endParaRPr>
+          </a:p>
+        </p:txBody>
+      </p:sp>
+      <p:cxnSp>
+        <p:nvCxnSpPr>
+          <p:cNvPr id="37" name="直線矢印コネクタ 36"/>
+          <p:cNvCxnSpPr>
+            <a:stCxn id="39" idx="1"/>
+            <a:endCxn id="18" idx="3"/>
+          </p:cNvCxnSpPr>
+          <p:nvPr/>
+        </p:nvCxnSpPr>
+        <p:spPr>
+          <a:xfrm flipH="1">
+            <a:off x="6176595" y="3748844"/>
+            <a:ext cx="987693" cy="0"/>
+          </a:xfrm>
+          <a:prstGeom prst="straightConnector1">
+            <a:avLst/>
+          </a:prstGeom>
+          <a:ln>
+            <a:headEnd type="arrow"/>
+            <a:tailEnd type="arrow"/>
+          </a:ln>
+        </p:spPr>
+        <p:style>
+          <a:lnRef idx="1">
+            <a:schemeClr val="accent1"/>
+          </a:lnRef>
+          <a:fillRef idx="0">
+            <a:schemeClr val="accent1"/>
+          </a:fillRef>
+          <a:effectRef idx="0">
+            <a:schemeClr val="accent1"/>
+          </a:effectRef>
+          <a:fontRef idx="minor">
+            <a:schemeClr val="tx1"/>
+          </a:fontRef>
+        </p:style>
+      </p:cxnSp>
+      <p:sp>
+        <p:nvSpPr>
+          <p:cNvPr id="72" name="テキスト ボックス 71"/>
+          <p:cNvSpPr txBox="1"/>
+          <p:nvPr/>
+        </p:nvSpPr>
+        <p:spPr>
+          <a:xfrm>
+            <a:off x="1016274" y="4074000"/>
+            <a:ext cx="606256" cy="307777"/>
+          </a:xfrm>
+          <a:prstGeom prst="rect">
+            <a:avLst/>
+          </a:prstGeom>
+          <a:noFill/>
+        </p:spPr>
+        <p:txBody>
+          <a:bodyPr wrap="none" rtlCol="0">
+            <a:spAutoFit/>
+          </a:bodyPr>
+          <a:lstStyle/>
+          <a:p>
+            <a:r>
+              <a:rPr kumimoji="1" lang="en-US" altLang="ja-JP" sz="1400" smtClean="0">
+                <a:solidFill>
+                  <a:schemeClr val="tx1">
+                    <a:lumMod val="50000"/>
+                    <a:lumOff val="50000"/>
+                  </a:schemeClr>
+                </a:solidFill>
+              </a:rPr>
+              <a:t>Cloud</a:t>
+            </a:r>
+            <a:endParaRPr kumimoji="1" lang="ja-JP" altLang="en-US" sz="1400">
+              <a:solidFill>
+                <a:schemeClr val="tx1">
+                  <a:lumMod val="50000"/>
+                  <a:lumOff val="50000"/>
+                </a:schemeClr>
+              </a:solidFill>
+            </a:endParaRPr>
+          </a:p>
+        </p:txBody>
+      </p:sp>
+      <p:sp>
+        <p:nvSpPr>
+          <p:cNvPr id="39" name="正方形/長方形 38"/>
+          <p:cNvSpPr/>
+          <p:nvPr/>
+        </p:nvSpPr>
+        <p:spPr>
+          <a:xfrm>
+            <a:off x="7164288" y="3437299"/>
+            <a:ext cx="1080120" cy="623090"/>
+          </a:xfrm>
+          <a:prstGeom prst="rect">
+            <a:avLst/>
+          </a:prstGeom>
+          <a:solidFill>
+            <a:schemeClr val="accent1">
+              <a:lumMod val="20000"/>
+              <a:lumOff val="80000"/>
+            </a:schemeClr>
+          </a:solidFill>
+          <a:ln w="3175">
+            <a:prstDash val="sysDot"/>
+          </a:ln>
+        </p:spPr>
+        <p:style>
+          <a:lnRef idx="2">
+            <a:schemeClr val="accent1">
+              <a:shade val="50000"/>
+            </a:schemeClr>
+          </a:lnRef>
+          <a:fillRef idx="1">
+            <a:schemeClr val="accent1"/>
+          </a:fillRef>
+          <a:effectRef idx="0">
+            <a:schemeClr val="accent1"/>
+          </a:effectRef>
+          <a:fontRef idx="minor">
+            <a:schemeClr val="lt1"/>
+          </a:fontRef>
+        </p:style>
+        <p:txBody>
+          <a:bodyPr rtlCol="0" anchor="ctr"/>
+          <a:lstStyle/>
+          <a:p>
+            <a:pPr algn="ctr"/>
+            <a:r>
+              <a:rPr kumimoji="1" lang="en-US" altLang="ja-JP" sz="1600" smtClean="0">
+                <a:solidFill>
+                  <a:schemeClr val="tx1">
+                    <a:lumMod val="50000"/>
+                    <a:lumOff val="50000"/>
+                  </a:schemeClr>
+                </a:solidFill>
+              </a:rPr>
+              <a:t>BLE</a:t>
+            </a:r>
+          </a:p>
+          <a:p>
+            <a:pPr algn="ctr"/>
+            <a:r>
+              <a:rPr lang="en-US" altLang="ja-JP" sz="1600" smtClean="0">
+                <a:solidFill>
+                  <a:schemeClr val="tx1">
+                    <a:lumMod val="50000"/>
+                    <a:lumOff val="50000"/>
+                  </a:schemeClr>
+                </a:solidFill>
+              </a:rPr>
+              <a:t>Peripheral</a:t>
+            </a:r>
+            <a:endParaRPr kumimoji="1" lang="ja-JP" altLang="en-US" sz="1600">
+              <a:solidFill>
+                <a:schemeClr val="tx1">
+                  <a:lumMod val="50000"/>
+                  <a:lumOff val="50000"/>
+                </a:schemeClr>
+              </a:solidFill>
+            </a:endParaRPr>
+          </a:p>
+        </p:txBody>
+      </p:sp>
+      <p:sp>
+        <p:nvSpPr>
+          <p:cNvPr id="7" name="正方形/長方形 6"/>
+          <p:cNvSpPr/>
+          <p:nvPr/>
+        </p:nvSpPr>
+        <p:spPr>
+          <a:xfrm>
+            <a:off x="3131840" y="2617228"/>
+            <a:ext cx="1008112" cy="749186"/>
+          </a:xfrm>
+          <a:prstGeom prst="rect">
+            <a:avLst/>
+          </a:prstGeom>
+          <a:solidFill>
+            <a:schemeClr val="accent2">
+              <a:lumMod val="20000"/>
+              <a:lumOff val="80000"/>
+            </a:schemeClr>
+          </a:solidFill>
+          <a:ln w="3175">
+            <a:solidFill>
+              <a:schemeClr val="accent2"/>
+            </a:solidFill>
+            <a:prstDash val="sysDot"/>
+          </a:ln>
+        </p:spPr>
+        <p:style>
+          <a:lnRef idx="2">
+            <a:schemeClr val="accent1">
+              <a:shade val="50000"/>
+            </a:schemeClr>
+          </a:lnRef>
+          <a:fillRef idx="1">
+            <a:schemeClr val="accent1"/>
+          </a:fillRef>
+          <a:effectRef idx="0">
+            <a:schemeClr val="accent1"/>
+          </a:effectRef>
+          <a:fontRef idx="minor">
+            <a:schemeClr val="lt1"/>
+          </a:fontRef>
+        </p:style>
+        <p:txBody>
+          <a:bodyPr rtlCol="0" anchor="ctr"/>
+          <a:lstStyle/>
+          <a:p>
+            <a:pPr algn="ctr"/>
+            <a:r>
+              <a:rPr kumimoji="1" lang="en-US" altLang="ja-JP" smtClean="0">
+                <a:solidFill>
+                  <a:schemeClr val="tx1">
+                    <a:lumMod val="50000"/>
+                    <a:lumOff val="50000"/>
+                  </a:schemeClr>
+                </a:solidFill>
+              </a:rPr>
+              <a:t>HTTP</a:t>
+            </a:r>
+          </a:p>
+          <a:p>
+            <a:pPr algn="ctr"/>
+            <a:r>
+              <a:rPr lang="en-US" altLang="ja-JP" smtClean="0">
+                <a:solidFill>
+                  <a:schemeClr val="tx1">
+                    <a:lumMod val="50000"/>
+                    <a:lumOff val="50000"/>
+                  </a:schemeClr>
+                </a:solidFill>
+              </a:rPr>
+              <a:t>Server</a:t>
+            </a:r>
+            <a:endParaRPr kumimoji="1" lang="ja-JP" altLang="en-US" smtClean="0">
+              <a:solidFill>
+                <a:schemeClr val="tx1">
+                  <a:lumMod val="50000"/>
+                  <a:lumOff val="50000"/>
+                </a:schemeClr>
+              </a:solidFill>
+            </a:endParaRPr>
+          </a:p>
+        </p:txBody>
+      </p:sp>
+      <p:sp>
+        <p:nvSpPr>
+          <p:cNvPr id="17" name="正方形/長方形 16"/>
+          <p:cNvSpPr/>
+          <p:nvPr/>
+        </p:nvSpPr>
+        <p:spPr>
+          <a:xfrm>
+            <a:off x="3131840" y="4254054"/>
+            <a:ext cx="1008112" cy="759122"/>
+          </a:xfrm>
+          <a:prstGeom prst="rect">
+            <a:avLst/>
+          </a:prstGeom>
+          <a:solidFill>
+            <a:schemeClr val="accent2">
+              <a:lumMod val="20000"/>
+              <a:lumOff val="80000"/>
+            </a:schemeClr>
+          </a:solidFill>
+          <a:ln w="3175">
+            <a:solidFill>
+              <a:schemeClr val="accent2"/>
+            </a:solidFill>
+            <a:prstDash val="sysDot"/>
+          </a:ln>
+        </p:spPr>
+        <p:style>
+          <a:lnRef idx="2">
+            <a:schemeClr val="accent1">
+              <a:shade val="50000"/>
+            </a:schemeClr>
+          </a:lnRef>
+          <a:fillRef idx="1">
+            <a:schemeClr val="accent1"/>
+          </a:fillRef>
+          <a:effectRef idx="0">
+            <a:schemeClr val="accent1"/>
+          </a:effectRef>
+          <a:fontRef idx="minor">
+            <a:schemeClr val="lt1"/>
+          </a:fontRef>
+        </p:style>
+        <p:txBody>
+          <a:bodyPr rtlCol="0" anchor="ctr"/>
+          <a:lstStyle/>
+          <a:p>
+            <a:pPr algn="ctr"/>
+            <a:r>
+              <a:rPr kumimoji="1" lang="en-US" altLang="ja-JP" smtClean="0">
+                <a:solidFill>
+                  <a:schemeClr val="tx1">
+                    <a:lumMod val="50000"/>
+                    <a:lumOff val="50000"/>
+                  </a:schemeClr>
+                </a:solidFill>
+              </a:rPr>
+              <a:t>HTTP</a:t>
+            </a:r>
+          </a:p>
+          <a:p>
+            <a:pPr algn="ctr"/>
+            <a:r>
+              <a:rPr lang="en-US" altLang="ja-JP" smtClean="0">
+                <a:solidFill>
+                  <a:schemeClr val="tx1">
+                    <a:lumMod val="50000"/>
+                    <a:lumOff val="50000"/>
+                  </a:schemeClr>
+                </a:solidFill>
+              </a:rPr>
+              <a:t>Client</a:t>
+            </a:r>
+            <a:endParaRPr kumimoji="1" lang="ja-JP" altLang="en-US" smtClean="0">
+              <a:solidFill>
+                <a:schemeClr val="tx1">
+                  <a:lumMod val="50000"/>
+                  <a:lumOff val="50000"/>
+                </a:schemeClr>
+              </a:solidFill>
+            </a:endParaRPr>
+          </a:p>
+        </p:txBody>
+      </p:sp>
+      <p:sp>
+        <p:nvSpPr>
+          <p:cNvPr id="18" name="正方形/長方形 17"/>
+          <p:cNvSpPr/>
+          <p:nvPr/>
+        </p:nvSpPr>
+        <p:spPr>
+          <a:xfrm>
+            <a:off x="5168483" y="3388723"/>
+            <a:ext cx="1008112" cy="720242"/>
+          </a:xfrm>
+          <a:prstGeom prst="rect">
+            <a:avLst/>
+          </a:prstGeom>
+          <a:solidFill>
+            <a:schemeClr val="accent2">
+              <a:lumMod val="20000"/>
+              <a:lumOff val="80000"/>
+            </a:schemeClr>
+          </a:solidFill>
+          <a:ln w="3175">
+            <a:solidFill>
+              <a:schemeClr val="accent2"/>
+            </a:solidFill>
+            <a:prstDash val="sysDot"/>
+          </a:ln>
+        </p:spPr>
+        <p:style>
+          <a:lnRef idx="2">
+            <a:schemeClr val="accent1">
+              <a:shade val="50000"/>
+            </a:schemeClr>
+          </a:lnRef>
+          <a:fillRef idx="1">
+            <a:schemeClr val="accent1"/>
+          </a:fillRef>
+          <a:effectRef idx="0">
+            <a:schemeClr val="accent1"/>
+          </a:effectRef>
+          <a:fontRef idx="minor">
+            <a:schemeClr val="lt1"/>
+          </a:fontRef>
+        </p:style>
+        <p:txBody>
+          <a:bodyPr rtlCol="0" anchor="ctr"/>
+          <a:lstStyle/>
+          <a:p>
+            <a:pPr algn="ctr"/>
+            <a:r>
+              <a:rPr kumimoji="1" lang="en-US" altLang="ja-JP" smtClean="0">
+                <a:solidFill>
+                  <a:schemeClr val="tx1">
+                    <a:lumMod val="50000"/>
+                    <a:lumOff val="50000"/>
+                  </a:schemeClr>
+                </a:solidFill>
+              </a:rPr>
+              <a:t>BLE</a:t>
+            </a:r>
+          </a:p>
+          <a:p>
+            <a:pPr algn="ctr"/>
+            <a:r>
+              <a:rPr lang="en-US" altLang="ja-JP" smtClean="0">
+                <a:solidFill>
+                  <a:schemeClr val="tx1">
+                    <a:lumMod val="50000"/>
+                    <a:lumOff val="50000"/>
+                  </a:schemeClr>
+                </a:solidFill>
+              </a:rPr>
+              <a:t>Central</a:t>
+            </a:r>
+            <a:endParaRPr kumimoji="1" lang="ja-JP" altLang="en-US" smtClean="0">
+              <a:solidFill>
+                <a:schemeClr val="tx1">
+                  <a:lumMod val="50000"/>
+                  <a:lumOff val="50000"/>
+                </a:schemeClr>
+              </a:solidFill>
+            </a:endParaRPr>
+          </a:p>
+        </p:txBody>
+      </p:sp>
+      <p:cxnSp>
+        <p:nvCxnSpPr>
+          <p:cNvPr id="10" name="直線矢印コネクタ 9"/>
+          <p:cNvCxnSpPr>
+            <a:stCxn id="7" idx="3"/>
+            <a:endCxn id="18" idx="1"/>
+          </p:cNvCxnSpPr>
+          <p:nvPr/>
+        </p:nvCxnSpPr>
+        <p:spPr>
+          <a:xfrm>
+            <a:off x="4139952" y="2991821"/>
+            <a:ext cx="1028531" cy="757023"/>
+          </a:xfrm>
+          <a:prstGeom prst="straightConnector1">
+            <a:avLst/>
+          </a:prstGeom>
+          <a:ln>
+            <a:tailEnd type="arrow"/>
+          </a:ln>
+        </p:spPr>
+        <p:style>
+          <a:lnRef idx="1">
+            <a:schemeClr val="accent1"/>
+          </a:lnRef>
+          <a:fillRef idx="0">
+            <a:schemeClr val="accent1"/>
+          </a:fillRef>
+          <a:effectRef idx="0">
+            <a:schemeClr val="accent1"/>
+          </a:effectRef>
+          <a:fontRef idx="minor">
+            <a:schemeClr val="tx1"/>
+          </a:fontRef>
+        </p:style>
+      </p:cxnSp>
+      <p:cxnSp>
+        <p:nvCxnSpPr>
+          <p:cNvPr id="13" name="直線矢印コネクタ 12"/>
+          <p:cNvCxnSpPr>
+            <a:stCxn id="18" idx="1"/>
+            <a:endCxn id="17" idx="3"/>
+          </p:cNvCxnSpPr>
+          <p:nvPr/>
+        </p:nvCxnSpPr>
+        <p:spPr>
+          <a:xfrm flipH="1">
+            <a:off x="4139952" y="3748844"/>
+            <a:ext cx="1028531" cy="884771"/>
+          </a:xfrm>
+          <a:prstGeom prst="straightConnector1">
+            <a:avLst/>
+          </a:prstGeom>
+          <a:ln>
+            <a:tailEnd type="arrow"/>
+          </a:ln>
+        </p:spPr>
+        <p:style>
+          <a:lnRef idx="1">
+            <a:schemeClr val="accent1"/>
+          </a:lnRef>
+          <a:fillRef idx="0">
+            <a:schemeClr val="accent1"/>
+          </a:fillRef>
+          <a:effectRef idx="0">
+            <a:schemeClr val="accent1"/>
+          </a:effectRef>
+          <a:fontRef idx="minor">
+            <a:schemeClr val="tx1"/>
+          </a:fontRef>
+        </p:style>
+      </p:cxnSp>
+      <p:cxnSp>
+        <p:nvCxnSpPr>
+          <p:cNvPr id="16" name="直線矢印コネクタ 15"/>
+          <p:cNvCxnSpPr>
+            <a:stCxn id="4" idx="2"/>
+            <a:endCxn id="7" idx="1"/>
+          </p:cNvCxnSpPr>
+          <p:nvPr/>
+        </p:nvCxnSpPr>
+        <p:spPr>
+          <a:xfrm flipV="1">
+            <a:off x="2023546" y="2991821"/>
+            <a:ext cx="1108294" cy="592495"/>
+          </a:xfrm>
+          <a:prstGeom prst="straightConnector1">
+            <a:avLst/>
+          </a:prstGeom>
+          <a:ln>
+            <a:tailEnd type="arrow"/>
+          </a:ln>
+        </p:spPr>
+        <p:style>
+          <a:lnRef idx="1">
+            <a:schemeClr val="accent1"/>
+          </a:lnRef>
+          <a:fillRef idx="0">
+            <a:schemeClr val="accent1"/>
+          </a:fillRef>
+          <a:effectRef idx="0">
+            <a:schemeClr val="accent1"/>
+          </a:effectRef>
+          <a:fontRef idx="minor">
+            <a:schemeClr val="tx1"/>
+          </a:fontRef>
+        </p:style>
+      </p:cxnSp>
+      <p:cxnSp>
+        <p:nvCxnSpPr>
+          <p:cNvPr id="20" name="直線矢印コネクタ 19"/>
+          <p:cNvCxnSpPr>
+            <a:stCxn id="17" idx="1"/>
+            <a:endCxn id="4" idx="2"/>
+          </p:cNvCxnSpPr>
+          <p:nvPr/>
+        </p:nvCxnSpPr>
+        <p:spPr>
+          <a:xfrm flipH="1" flipV="1">
+            <a:off x="2023546" y="3584316"/>
+            <a:ext cx="1108294" cy="1049299"/>
+          </a:xfrm>
+          <a:prstGeom prst="straightConnector1">
+            <a:avLst/>
+          </a:prstGeom>
+          <a:ln>
+            <a:tailEnd type="arrow"/>
+          </a:ln>
+        </p:spPr>
+        <p:style>
+          <a:lnRef idx="1">
+            <a:schemeClr val="accent1"/>
+          </a:lnRef>
+          <a:fillRef idx="0">
+            <a:schemeClr val="accent1"/>
+          </a:fillRef>
+          <a:effectRef idx="0">
+            <a:schemeClr val="accent1"/>
+          </a:effectRef>
+          <a:fontRef idx="minor">
+            <a:schemeClr val="tx1"/>
+          </a:fontRef>
+        </p:style>
+      </p:cxnSp>
+      <p:sp>
+        <p:nvSpPr>
+          <p:cNvPr id="40" name="テキスト ボックス 39"/>
+          <p:cNvSpPr txBox="1"/>
+          <p:nvPr/>
+        </p:nvSpPr>
+        <p:spPr>
+          <a:xfrm>
+            <a:off x="4427984" y="2763863"/>
+            <a:ext cx="592663" cy="523220"/>
+          </a:xfrm>
+          <a:prstGeom prst="rect">
+            <a:avLst/>
+          </a:prstGeom>
+          <a:noFill/>
+        </p:spPr>
+        <p:txBody>
+          <a:bodyPr wrap="none" rtlCol="0">
+            <a:spAutoFit/>
+          </a:bodyPr>
+          <a:lstStyle/>
+          <a:p>
+            <a:r>
+              <a:rPr kumimoji="1" lang="en-US" altLang="ja-JP" sz="1400" smtClean="0">
+                <a:solidFill>
+                  <a:schemeClr val="tx1">
+                    <a:lumMod val="50000"/>
+                    <a:lumOff val="50000"/>
+                  </a:schemeClr>
+                </a:solidFill>
+              </a:rPr>
+              <a:t>Scan</a:t>
+            </a:r>
+          </a:p>
+          <a:p>
+            <a:r>
+              <a:rPr lang="en-US" altLang="ja-JP" sz="1400" smtClean="0">
+                <a:solidFill>
+                  <a:schemeClr val="tx1">
+                    <a:lumMod val="50000"/>
+                    <a:lumOff val="50000"/>
+                  </a:schemeClr>
+                </a:solidFill>
+              </a:rPr>
+              <a:t>Write</a:t>
+            </a:r>
+            <a:endParaRPr kumimoji="1" lang="ja-JP" altLang="en-US" sz="1400">
+              <a:solidFill>
+                <a:schemeClr val="tx1">
+                  <a:lumMod val="50000"/>
+                  <a:lumOff val="50000"/>
+                </a:schemeClr>
+              </a:solidFill>
+            </a:endParaRPr>
+          </a:p>
+        </p:txBody>
+      </p:sp>
+      <p:sp>
+        <p:nvSpPr>
+          <p:cNvPr id="41" name="テキスト ボックス 40"/>
+          <p:cNvSpPr txBox="1"/>
+          <p:nvPr/>
+        </p:nvSpPr>
+        <p:spPr>
+          <a:xfrm>
+            <a:off x="4441371" y="4318168"/>
+            <a:ext cx="1043940" cy="307777"/>
+          </a:xfrm>
+          <a:prstGeom prst="rect">
+            <a:avLst/>
+          </a:prstGeom>
+          <a:noFill/>
+        </p:spPr>
+        <p:txBody>
+          <a:bodyPr wrap="none" rtlCol="0">
+            <a:spAutoFit/>
+          </a:bodyPr>
+          <a:lstStyle/>
+          <a:p>
+            <a:r>
+              <a:rPr lang="en-US" altLang="ja-JP" sz="1400" smtClean="0">
+                <a:solidFill>
+                  <a:schemeClr val="tx1">
+                    <a:lumMod val="50000"/>
+                    <a:lumOff val="50000"/>
+                  </a:schemeClr>
+                </a:solidFill>
+              </a:rPr>
+              <a:t>Notification</a:t>
+            </a:r>
+            <a:endParaRPr kumimoji="1" lang="ja-JP" altLang="en-US" sz="1400">
+              <a:solidFill>
+                <a:schemeClr val="tx1">
+                  <a:lumMod val="50000"/>
+                  <a:lumOff val="50000"/>
+                </a:schemeClr>
+              </a:solidFill>
+            </a:endParaRPr>
+          </a:p>
+        </p:txBody>
+      </p:sp>
+    </p:spTree>
+    <p:extLst>
+      <p:ext uri="{BB962C8B-B14F-4D97-AF65-F5344CB8AC3E}">
+        <p14:creationId xmlns:p14="http://schemas.microsoft.com/office/powerpoint/2010/main" val="1703907509"/>
       </p:ext>
     </p:extLst>
   </p:cSld>

</xml_diff>